<commit_message>
Update Python FP 1
</commit_message>
<xml_diff>
--- a/Programming 4/Week 12/S1. Functional Programming with Python I.pptx
+++ b/Programming 4/Week 12/S1. Functional Programming with Python I.pptx
@@ -5,24 +5,22 @@
     <p:sldMasterId id="2147483648" r:id="rId1"/>
   </p:sldMasterIdLst>
   <p:notesMasterIdLst>
-    <p:notesMasterId r:id="rId17"/>
+    <p:notesMasterId r:id="rId15"/>
   </p:notesMasterIdLst>
   <p:sldIdLst>
     <p:sldId id="256" r:id="rId2"/>
     <p:sldId id="258" r:id="rId3"/>
     <p:sldId id="259" r:id="rId4"/>
     <p:sldId id="260" r:id="rId5"/>
-    <p:sldId id="261" r:id="rId6"/>
-    <p:sldId id="262" r:id="rId7"/>
-    <p:sldId id="263" r:id="rId8"/>
-    <p:sldId id="264" r:id="rId9"/>
-    <p:sldId id="265" r:id="rId10"/>
-    <p:sldId id="266" r:id="rId11"/>
-    <p:sldId id="271" r:id="rId12"/>
-    <p:sldId id="267" r:id="rId13"/>
-    <p:sldId id="268" r:id="rId14"/>
-    <p:sldId id="269" r:id="rId15"/>
-    <p:sldId id="270" r:id="rId16"/>
+    <p:sldId id="262" r:id="rId6"/>
+    <p:sldId id="263" r:id="rId7"/>
+    <p:sldId id="264" r:id="rId8"/>
+    <p:sldId id="265" r:id="rId9"/>
+    <p:sldId id="266" r:id="rId10"/>
+    <p:sldId id="271" r:id="rId11"/>
+    <p:sldId id="267" r:id="rId12"/>
+    <p:sldId id="269" r:id="rId13"/>
+    <p:sldId id="270" r:id="rId14"/>
   </p:sldIdLst>
   <p:sldSz cx="12192000" cy="6858000"/>
   <p:notesSz cx="6858000" cy="9144000"/>
@@ -635,37 +633,6 @@
               <a:tabLst/>
               <a:defRPr/>
             </a:pPr>
-            <a:r>
-              <a:rPr lang="en-US" dirty="0" smtClean="0"/>
-              <a:t>In Python3,</a:t>
-            </a:r>
-            <a:r>
-              <a:rPr lang="en-US" baseline="0" dirty="0" smtClean="0"/>
-              <a:t> reduce has been removed from the main library</a:t>
-            </a:r>
-          </a:p>
-          <a:p>
-            <a:pPr marL="171450" marR="0" lvl="2" indent="-171450" algn="l" defTabSz="914400" rtl="0" eaLnBrk="1" fontAlgn="auto" latinLnBrk="0" hangingPunct="1">
-              <a:lnSpc>
-                <a:spcPct val="100000"/>
-              </a:lnSpc>
-              <a:spcBef>
-                <a:spcPts val="0"/>
-              </a:spcBef>
-              <a:spcAft>
-                <a:spcPts val="0"/>
-              </a:spcAft>
-              <a:buClrTx/>
-              <a:buSzTx/>
-              <a:buFont typeface="Arial" charset="0"/>
-              <a:buChar char="•"/>
-              <a:tabLst/>
-              <a:defRPr/>
-            </a:pPr>
-            <a:r>
-              <a:rPr lang="en-US" baseline="0" dirty="0" smtClean="0"/>
-              <a:t>Use functools library instead. This should go at the top of your file</a:t>
-            </a:r>
             <a:endParaRPr lang="en-US" dirty="0" smtClean="0"/>
           </a:p>
         </p:txBody>
@@ -696,7 +663,7 @@
     </p:spTree>
     <p:extLst>
       <p:ext uri="{BB962C8B-B14F-4D97-AF65-F5344CB8AC3E}">
-        <p14:creationId xmlns:p14="http://schemas.microsoft.com/office/powerpoint/2010/main" val="673408328"/>
+        <p14:creationId xmlns:p14="http://schemas.microsoft.com/office/powerpoint/2010/main" val="1633725763"/>
       </p:ext>
     </p:extLst>
   </p:cSld>
@@ -767,6 +734,61 @@
               <a:tabLst/>
               <a:defRPr/>
             </a:pPr>
+            <a:r>
+              <a:rPr lang="en-US" sz="1200" b="0" i="0" kern="1200" dirty="0" smtClean="0">
+                <a:solidFill>
+                  <a:schemeClr val="tx1"/>
+                </a:solidFill>
+                <a:effectLst/>
+                <a:latin typeface="+mn-lt"/>
+                <a:ea typeface="+mn-ea"/>
+                <a:cs typeface="+mn-cs"/>
+              </a:rPr>
+              <a:t>Functions defined without a name</a:t>
+            </a:r>
+          </a:p>
+          <a:p>
+            <a:pPr marL="171450" marR="0" lvl="2" indent="-171450" algn="l" defTabSz="914400" rtl="0" eaLnBrk="1" fontAlgn="auto" latinLnBrk="0" hangingPunct="1">
+              <a:lnSpc>
+                <a:spcPct val="100000"/>
+              </a:lnSpc>
+              <a:spcBef>
+                <a:spcPts val="0"/>
+              </a:spcBef>
+              <a:spcAft>
+                <a:spcPts val="0"/>
+              </a:spcAft>
+              <a:buClrTx/>
+              <a:buSzTx/>
+              <a:buFont typeface="Arial" charset="0"/>
+              <a:buChar char="•"/>
+              <a:tabLst/>
+              <a:defRPr/>
+            </a:pPr>
+            <a:r>
+              <a:rPr lang="en-US" sz="1200" b="0" i="0" kern="1200" dirty="0" smtClean="0">
+                <a:solidFill>
+                  <a:schemeClr val="tx1"/>
+                </a:solidFill>
+                <a:effectLst/>
+                <a:latin typeface="+mn-lt"/>
+                <a:ea typeface="+mn-ea"/>
+                <a:cs typeface="+mn-cs"/>
+              </a:rPr>
+              <a:t>In situations where you just want to pass some worker logic into a higher-order</a:t>
+            </a:r>
+            <a:r>
+              <a:rPr lang="en-US" sz="1200" b="0" i="0" kern="1200" baseline="0" dirty="0" smtClean="0">
+                <a:solidFill>
+                  <a:schemeClr val="tx1"/>
+                </a:solidFill>
+                <a:effectLst/>
+                <a:latin typeface="+mn-lt"/>
+                <a:ea typeface="+mn-ea"/>
+                <a:cs typeface="+mn-cs"/>
+              </a:rPr>
+              <a:t> function like map, filter and reduce, but don’t want to save it for later, you can define it anonymously on the fly</a:t>
+            </a:r>
             <a:endParaRPr lang="en-US" dirty="0" smtClean="0"/>
           </a:p>
         </p:txBody>
@@ -797,7 +819,7 @@
     </p:spTree>
     <p:extLst>
       <p:ext uri="{BB962C8B-B14F-4D97-AF65-F5344CB8AC3E}">
-        <p14:creationId xmlns:p14="http://schemas.microsoft.com/office/powerpoint/2010/main" val="1633725763"/>
+        <p14:creationId xmlns:p14="http://schemas.microsoft.com/office/powerpoint/2010/main" val="1396094550"/>
       </p:ext>
     </p:extLst>
   </p:cSld>
@@ -869,16 +891,12 @@
               <a:defRPr/>
             </a:pPr>
             <a:r>
-              <a:rPr lang="en-US" sz="1200" b="0" i="0" kern="1200" dirty="0" smtClean="0">
-                <a:solidFill>
-                  <a:schemeClr val="tx1"/>
-                </a:solidFill>
-                <a:effectLst/>
-                <a:latin typeface="+mn-lt"/>
-                <a:ea typeface="+mn-ea"/>
-                <a:cs typeface="+mn-cs"/>
-              </a:rPr>
-              <a:t>Functions defined without a name</a:t>
+              <a:rPr lang="en-US" dirty="0" smtClean="0"/>
+              <a:t>Alternatively, you can pass the lambda instead of creating a separate</a:t>
+            </a:r>
+            <a:r>
+              <a:rPr lang="en-US" baseline="0" dirty="0" smtClean="0"/>
+              <a:t> variable</a:t>
             </a:r>
           </a:p>
           <a:p>
@@ -900,28 +918,70 @@
               <a:defRPr/>
             </a:pPr>
             <a:r>
-              <a:rPr lang="en-US" sz="1200" b="0" i="0" kern="1200" dirty="0" smtClean="0">
-                <a:solidFill>
-                  <a:schemeClr val="tx1"/>
-                </a:solidFill>
-                <a:effectLst/>
-                <a:latin typeface="+mn-lt"/>
-                <a:ea typeface="+mn-ea"/>
-                <a:cs typeface="+mn-cs"/>
-              </a:rPr>
-              <a:t>In situations where you just want to pass some worker logic into a higher-order</a:t>
-            </a:r>
-            <a:r>
-              <a:rPr lang="en-US" sz="1200" b="0" i="0" kern="1200" baseline="0" dirty="0" smtClean="0">
-                <a:solidFill>
-                  <a:schemeClr val="tx1"/>
-                </a:solidFill>
-                <a:effectLst/>
-                <a:latin typeface="+mn-lt"/>
-                <a:ea typeface="+mn-ea"/>
-                <a:cs typeface="+mn-cs"/>
-              </a:rPr>
-              <a:t> function like map, filter and reduce, but don’t want to save it for later, you can define it anonymously on the fly</a:t>
+              <a:rPr lang="en-US" baseline="0" dirty="0" smtClean="0"/>
+              <a:t>Could you write this same logic in C++ or Java? of course</a:t>
+            </a:r>
+            <a:r>
+              <a:rPr lang="mr-IN" baseline="0" dirty="0" smtClean="0"/>
+              <a:t>…</a:t>
+            </a:r>
+            <a:r>
+              <a:rPr lang="en-AU" baseline="0" dirty="0" smtClean="0"/>
+              <a:t>would it be nearly succinct</a:t>
+            </a:r>
+            <a:r>
+              <a:rPr lang="mr-IN" baseline="0" dirty="0" smtClean="0"/>
+              <a:t>…</a:t>
+            </a:r>
+            <a:r>
+              <a:rPr lang="en-AU" baseline="0" dirty="0" smtClean="0"/>
+              <a:t>no!</a:t>
+            </a:r>
+          </a:p>
+          <a:p>
+            <a:pPr marL="171450" marR="0" lvl="2" indent="-171450" algn="l" defTabSz="914400" rtl="0" eaLnBrk="1" fontAlgn="auto" latinLnBrk="0" hangingPunct="1">
+              <a:lnSpc>
+                <a:spcPct val="100000"/>
+              </a:lnSpc>
+              <a:spcBef>
+                <a:spcPts val="0"/>
+              </a:spcBef>
+              <a:spcAft>
+                <a:spcPts val="0"/>
+              </a:spcAft>
+              <a:buClrTx/>
+              <a:buSzTx/>
+              <a:buFont typeface="Arial" charset="0"/>
+              <a:buChar char="•"/>
+              <a:tabLst/>
+              <a:defRPr/>
+            </a:pPr>
+            <a:r>
+              <a:rPr lang="en-AU" baseline="0" dirty="0" smtClean="0"/>
+              <a:t>Do you see any downsides? For a person who doesn't know much functional programming, it would take a while to understand what the code is doing</a:t>
+            </a:r>
+          </a:p>
+          <a:p>
+            <a:pPr marL="171450" marR="0" lvl="2" indent="-171450" algn="l" defTabSz="914400" rtl="0" eaLnBrk="1" fontAlgn="auto" latinLnBrk="0" hangingPunct="1">
+              <a:lnSpc>
+                <a:spcPct val="100000"/>
+              </a:lnSpc>
+              <a:spcBef>
+                <a:spcPts val="0"/>
+              </a:spcBef>
+              <a:spcAft>
+                <a:spcPts val="0"/>
+              </a:spcAft>
+              <a:buClrTx/>
+              <a:buSzTx/>
+              <a:buFont typeface="Arial" charset="0"/>
+              <a:buChar char="•"/>
+              <a:tabLst/>
+              <a:defRPr/>
+            </a:pPr>
+            <a:r>
+              <a:rPr lang="en-AU" baseline="0" dirty="0" smtClean="0"/>
+              <a:t>We trade of brevity and readability</a:t>
             </a:r>
             <a:endParaRPr lang="en-US" dirty="0" smtClean="0"/>
           </a:p>
@@ -953,7 +1013,7 @@
     </p:spTree>
     <p:extLst>
       <p:ext uri="{BB962C8B-B14F-4D97-AF65-F5344CB8AC3E}">
-        <p14:creationId xmlns:p14="http://schemas.microsoft.com/office/powerpoint/2010/main" val="1396094550"/>
+        <p14:creationId xmlns:p14="http://schemas.microsoft.com/office/powerpoint/2010/main" val="327437324"/>
       </p:ext>
     </p:extLst>
   </p:cSld>
@@ -1025,368 +1085,6 @@
               <a:defRPr/>
             </a:pPr>
             <a:r>
-              <a:rPr lang="en-US" sz="1200" b="0" i="0" kern="1200" dirty="0" smtClean="0">
-                <a:solidFill>
-                  <a:schemeClr val="tx1"/>
-                </a:solidFill>
-                <a:effectLst/>
-                <a:latin typeface="+mn-lt"/>
-                <a:ea typeface="+mn-ea"/>
-                <a:cs typeface="+mn-cs"/>
-              </a:rPr>
-              <a:t>Functions defined without a name</a:t>
-            </a:r>
-          </a:p>
-          <a:p>
-            <a:pPr marL="171450" marR="0" lvl="2" indent="-171450" algn="l" defTabSz="914400" rtl="0" eaLnBrk="1" fontAlgn="auto" latinLnBrk="0" hangingPunct="1">
-              <a:lnSpc>
-                <a:spcPct val="100000"/>
-              </a:lnSpc>
-              <a:spcBef>
-                <a:spcPts val="0"/>
-              </a:spcBef>
-              <a:spcAft>
-                <a:spcPts val="0"/>
-              </a:spcAft>
-              <a:buClrTx/>
-              <a:buSzTx/>
-              <a:buFont typeface="Arial" charset="0"/>
-              <a:buChar char="•"/>
-              <a:tabLst/>
-              <a:defRPr/>
-            </a:pPr>
-            <a:r>
-              <a:rPr lang="en-US" sz="1200" b="0" i="0" kern="1200" dirty="0" smtClean="0">
-                <a:solidFill>
-                  <a:schemeClr val="tx1"/>
-                </a:solidFill>
-                <a:effectLst/>
-                <a:latin typeface="+mn-lt"/>
-                <a:ea typeface="+mn-ea"/>
-                <a:cs typeface="+mn-cs"/>
-              </a:rPr>
-              <a:t>In situations where you just want to pass some worker logic into a higher-order</a:t>
-            </a:r>
-            <a:r>
-              <a:rPr lang="en-US" sz="1200" b="0" i="0" kern="1200" baseline="0" dirty="0" smtClean="0">
-                <a:solidFill>
-                  <a:schemeClr val="tx1"/>
-                </a:solidFill>
-                <a:effectLst/>
-                <a:latin typeface="+mn-lt"/>
-                <a:ea typeface="+mn-ea"/>
-                <a:cs typeface="+mn-cs"/>
-              </a:rPr>
-              <a:t> function like map, filter and reduce, but don’t want to save it for later, you can define it anonymously </a:t>
-            </a:r>
-            <a:r>
-              <a:rPr lang="en-US" sz="1200" b="0" i="0" kern="1200" baseline="0" smtClean="0">
-                <a:solidFill>
-                  <a:schemeClr val="tx1"/>
-                </a:solidFill>
-                <a:effectLst/>
-                <a:latin typeface="+mn-lt"/>
-                <a:ea typeface="+mn-ea"/>
-                <a:cs typeface="+mn-cs"/>
-              </a:rPr>
-              <a:t>on the fly</a:t>
-            </a:r>
-            <a:endParaRPr lang="en-US" dirty="0" smtClean="0"/>
-          </a:p>
-        </p:txBody>
-      </p:sp>
-      <p:sp>
-        <p:nvSpPr>
-          <p:cNvPr id="4" name="Slide Number Placeholder 3"/>
-          <p:cNvSpPr>
-            <a:spLocks noGrp="1"/>
-          </p:cNvSpPr>
-          <p:nvPr>
-            <p:ph type="sldNum" sz="quarter" idx="10"/>
-          </p:nvPr>
-        </p:nvSpPr>
-        <p:spPr/>
-        <p:txBody>
-          <a:bodyPr/>
-          <a:lstStyle/>
-          <a:p>
-            <a:fld id="{5C949890-84D1-B346-997E-B43A2CF20212}" type="slidenum">
-              <a:rPr lang="en-US" smtClean="0"/>
-              <a:t>13</a:t>
-            </a:fld>
-            <a:endParaRPr lang="en-US"/>
-          </a:p>
-        </p:txBody>
-      </p:sp>
-    </p:spTree>
-    <p:extLst>
-      <p:ext uri="{BB962C8B-B14F-4D97-AF65-F5344CB8AC3E}">
-        <p14:creationId xmlns:p14="http://schemas.microsoft.com/office/powerpoint/2010/main" val="777618216"/>
-      </p:ext>
-    </p:extLst>
-  </p:cSld>
-  <p:clrMapOvr>
-    <a:masterClrMapping/>
-  </p:clrMapOvr>
-</p:notes>
-</file>
-
-<file path=ppt/notesSlides/notesSlide14.xml><?xml version="1.0" encoding="utf-8"?>
-<p:notes xmlns:a="http://schemas.openxmlformats.org/drawingml/2006/main" xmlns:r="http://schemas.openxmlformats.org/officeDocument/2006/relationships" xmlns:p="http://schemas.openxmlformats.org/presentationml/2006/main">
-  <p:cSld>
-    <p:spTree>
-      <p:nvGrpSpPr>
-        <p:cNvPr id="1" name=""/>
-        <p:cNvGrpSpPr/>
-        <p:nvPr/>
-      </p:nvGrpSpPr>
-      <p:grpSpPr>
-        <a:xfrm>
-          <a:off x="0" y="0"/>
-          <a:ext cx="0" cy="0"/>
-          <a:chOff x="0" y="0"/>
-          <a:chExt cx="0" cy="0"/>
-        </a:xfrm>
-      </p:grpSpPr>
-      <p:sp>
-        <p:nvSpPr>
-          <p:cNvPr id="2" name="Slide Image Placeholder 1"/>
-          <p:cNvSpPr>
-            <a:spLocks noGrp="1" noRot="1" noChangeAspect="1"/>
-          </p:cNvSpPr>
-          <p:nvPr>
-            <p:ph type="sldImg"/>
-          </p:nvPr>
-        </p:nvSpPr>
-        <p:spPr/>
-      </p:sp>
-      <p:sp>
-        <p:nvSpPr>
-          <p:cNvPr id="3" name="Notes Placeholder 2"/>
-          <p:cNvSpPr>
-            <a:spLocks noGrp="1"/>
-          </p:cNvSpPr>
-          <p:nvPr>
-            <p:ph type="body" idx="1"/>
-          </p:nvPr>
-        </p:nvSpPr>
-        <p:spPr/>
-        <p:txBody>
-          <a:bodyPr/>
-          <a:lstStyle/>
-          <a:p>
-            <a:pPr marL="171450" marR="0" lvl="2" indent="-171450" algn="l" defTabSz="914400" rtl="0" eaLnBrk="1" fontAlgn="auto" latinLnBrk="0" hangingPunct="1">
-              <a:lnSpc>
-                <a:spcPct val="100000"/>
-              </a:lnSpc>
-              <a:spcBef>
-                <a:spcPts val="0"/>
-              </a:spcBef>
-              <a:spcAft>
-                <a:spcPts val="0"/>
-              </a:spcAft>
-              <a:buClrTx/>
-              <a:buSzTx/>
-              <a:buFont typeface="Arial" charset="0"/>
-              <a:buChar char="•"/>
-              <a:tabLst/>
-              <a:defRPr/>
-            </a:pPr>
-            <a:r>
-              <a:rPr lang="en-US" dirty="0" smtClean="0"/>
-              <a:t>Alternatively, you can pass the lambda instead of creating a separate</a:t>
-            </a:r>
-            <a:r>
-              <a:rPr lang="en-US" baseline="0" dirty="0" smtClean="0"/>
-              <a:t> variable</a:t>
-            </a:r>
-          </a:p>
-          <a:p>
-            <a:pPr marL="171450" marR="0" lvl="2" indent="-171450" algn="l" defTabSz="914400" rtl="0" eaLnBrk="1" fontAlgn="auto" latinLnBrk="0" hangingPunct="1">
-              <a:lnSpc>
-                <a:spcPct val="100000"/>
-              </a:lnSpc>
-              <a:spcBef>
-                <a:spcPts val="0"/>
-              </a:spcBef>
-              <a:spcAft>
-                <a:spcPts val="0"/>
-              </a:spcAft>
-              <a:buClrTx/>
-              <a:buSzTx/>
-              <a:buFont typeface="Arial" charset="0"/>
-              <a:buChar char="•"/>
-              <a:tabLst/>
-              <a:defRPr/>
-            </a:pPr>
-            <a:r>
-              <a:rPr lang="en-US" baseline="0" dirty="0" smtClean="0"/>
-              <a:t>Could you write this same logic in C++ or Java? of course</a:t>
-            </a:r>
-            <a:r>
-              <a:rPr lang="mr-IN" baseline="0" dirty="0" smtClean="0"/>
-              <a:t>…</a:t>
-            </a:r>
-            <a:r>
-              <a:rPr lang="en-AU" baseline="0" dirty="0" smtClean="0"/>
-              <a:t>would it be nearly succinct</a:t>
-            </a:r>
-            <a:r>
-              <a:rPr lang="mr-IN" baseline="0" dirty="0" smtClean="0"/>
-              <a:t>…</a:t>
-            </a:r>
-            <a:r>
-              <a:rPr lang="en-AU" baseline="0" dirty="0" smtClean="0"/>
-              <a:t>no!</a:t>
-            </a:r>
-          </a:p>
-          <a:p>
-            <a:pPr marL="171450" marR="0" lvl="2" indent="-171450" algn="l" defTabSz="914400" rtl="0" eaLnBrk="1" fontAlgn="auto" latinLnBrk="0" hangingPunct="1">
-              <a:lnSpc>
-                <a:spcPct val="100000"/>
-              </a:lnSpc>
-              <a:spcBef>
-                <a:spcPts val="0"/>
-              </a:spcBef>
-              <a:spcAft>
-                <a:spcPts val="0"/>
-              </a:spcAft>
-              <a:buClrTx/>
-              <a:buSzTx/>
-              <a:buFont typeface="Arial" charset="0"/>
-              <a:buChar char="•"/>
-              <a:tabLst/>
-              <a:defRPr/>
-            </a:pPr>
-            <a:r>
-              <a:rPr lang="en-AU" baseline="0" dirty="0" smtClean="0"/>
-              <a:t>Do you see any downsides? For a person who doesn't know much functional programming, it would take a while to understand what the code is doing</a:t>
-            </a:r>
-          </a:p>
-          <a:p>
-            <a:pPr marL="171450" marR="0" lvl="2" indent="-171450" algn="l" defTabSz="914400" rtl="0" eaLnBrk="1" fontAlgn="auto" latinLnBrk="0" hangingPunct="1">
-              <a:lnSpc>
-                <a:spcPct val="100000"/>
-              </a:lnSpc>
-              <a:spcBef>
-                <a:spcPts val="0"/>
-              </a:spcBef>
-              <a:spcAft>
-                <a:spcPts val="0"/>
-              </a:spcAft>
-              <a:buClrTx/>
-              <a:buSzTx/>
-              <a:buFont typeface="Arial" charset="0"/>
-              <a:buChar char="•"/>
-              <a:tabLst/>
-              <a:defRPr/>
-            </a:pPr>
-            <a:r>
-              <a:rPr lang="en-AU" baseline="0" dirty="0" smtClean="0"/>
-              <a:t>We trade of brevity and readability</a:t>
-            </a:r>
-            <a:endParaRPr lang="en-US" dirty="0" smtClean="0"/>
-          </a:p>
-        </p:txBody>
-      </p:sp>
-      <p:sp>
-        <p:nvSpPr>
-          <p:cNvPr id="4" name="Slide Number Placeholder 3"/>
-          <p:cNvSpPr>
-            <a:spLocks noGrp="1"/>
-          </p:cNvSpPr>
-          <p:nvPr>
-            <p:ph type="sldNum" sz="quarter" idx="10"/>
-          </p:nvPr>
-        </p:nvSpPr>
-        <p:spPr/>
-        <p:txBody>
-          <a:bodyPr/>
-          <a:lstStyle/>
-          <a:p>
-            <a:fld id="{5C949890-84D1-B346-997E-B43A2CF20212}" type="slidenum">
-              <a:rPr lang="en-US" smtClean="0"/>
-              <a:t>14</a:t>
-            </a:fld>
-            <a:endParaRPr lang="en-US"/>
-          </a:p>
-        </p:txBody>
-      </p:sp>
-    </p:spTree>
-    <p:extLst>
-      <p:ext uri="{BB962C8B-B14F-4D97-AF65-F5344CB8AC3E}">
-        <p14:creationId xmlns:p14="http://schemas.microsoft.com/office/powerpoint/2010/main" val="327437324"/>
-      </p:ext>
-    </p:extLst>
-  </p:cSld>
-  <p:clrMapOvr>
-    <a:masterClrMapping/>
-  </p:clrMapOvr>
-</p:notes>
-</file>
-
-<file path=ppt/notesSlides/notesSlide15.xml><?xml version="1.0" encoding="utf-8"?>
-<p:notes xmlns:a="http://schemas.openxmlformats.org/drawingml/2006/main" xmlns:r="http://schemas.openxmlformats.org/officeDocument/2006/relationships" xmlns:p="http://schemas.openxmlformats.org/presentationml/2006/main">
-  <p:cSld>
-    <p:spTree>
-      <p:nvGrpSpPr>
-        <p:cNvPr id="1" name=""/>
-        <p:cNvGrpSpPr/>
-        <p:nvPr/>
-      </p:nvGrpSpPr>
-      <p:grpSpPr>
-        <a:xfrm>
-          <a:off x="0" y="0"/>
-          <a:ext cx="0" cy="0"/>
-          <a:chOff x="0" y="0"/>
-          <a:chExt cx="0" cy="0"/>
-        </a:xfrm>
-      </p:grpSpPr>
-      <p:sp>
-        <p:nvSpPr>
-          <p:cNvPr id="2" name="Slide Image Placeholder 1"/>
-          <p:cNvSpPr>
-            <a:spLocks noGrp="1" noRot="1" noChangeAspect="1"/>
-          </p:cNvSpPr>
-          <p:nvPr>
-            <p:ph type="sldImg"/>
-          </p:nvPr>
-        </p:nvSpPr>
-        <p:spPr/>
-      </p:sp>
-      <p:sp>
-        <p:nvSpPr>
-          <p:cNvPr id="3" name="Notes Placeholder 2"/>
-          <p:cNvSpPr>
-            <a:spLocks noGrp="1"/>
-          </p:cNvSpPr>
-          <p:nvPr>
-            <p:ph type="body" idx="1"/>
-          </p:nvPr>
-        </p:nvSpPr>
-        <p:spPr/>
-        <p:txBody>
-          <a:bodyPr/>
-          <a:lstStyle/>
-          <a:p>
-            <a:pPr marL="171450" marR="0" lvl="2" indent="-171450" algn="l" defTabSz="914400" rtl="0" eaLnBrk="1" fontAlgn="auto" latinLnBrk="0" hangingPunct="1">
-              <a:lnSpc>
-                <a:spcPct val="100000"/>
-              </a:lnSpc>
-              <a:spcBef>
-                <a:spcPts val="0"/>
-              </a:spcBef>
-              <a:spcAft>
-                <a:spcPts val="0"/>
-              </a:spcAft>
-              <a:buClrTx/>
-              <a:buSzTx/>
-              <a:buFont typeface="Arial" charset="0"/>
-              <a:buChar char="•"/>
-              <a:tabLst/>
-              <a:defRPr/>
-            </a:pPr>
-            <a:r>
               <a:rPr lang="en-US" dirty="0" smtClean="0"/>
               <a:t>GVR dislikes functional programming in Python because</a:t>
             </a:r>
@@ -1415,7 +1113,7 @@
           <a:p>
             <a:fld id="{5C949890-84D1-B346-997E-B43A2CF20212}" type="slidenum">
               <a:rPr lang="en-US" smtClean="0"/>
-              <a:t>15</a:t>
+              <a:t>13</a:t>
             </a:fld>
             <a:endParaRPr lang="en-US"/>
           </a:p>
@@ -2046,7 +1744,19 @@
                 <a:ea typeface="+mn-ea"/>
                 <a:cs typeface="+mn-cs"/>
               </a:rPr>
-              <a:t> listening to other events</a:t>
+              <a:t> listening to </a:t>
+            </a:r>
+            <a:r>
+              <a:rPr lang="en-US" sz="1200" b="0" i="0" kern="1200" baseline="0" smtClean="0">
+                <a:solidFill>
+                  <a:schemeClr val="tx1"/>
+                </a:solidFill>
+                <a:effectLst/>
+                <a:latin typeface="+mn-lt"/>
+                <a:ea typeface="+mn-ea"/>
+                <a:cs typeface="+mn-cs"/>
+              </a:rPr>
+              <a:t>other events</a:t>
             </a:r>
             <a:endParaRPr lang="en-US" sz="1200" b="0" i="0" kern="1200" dirty="0" smtClean="0">
               <a:solidFill>
@@ -2134,7 +1844,7 @@
     </p:spTree>
     <p:extLst>
       <p:ext uri="{BB962C8B-B14F-4D97-AF65-F5344CB8AC3E}">
-        <p14:creationId xmlns:p14="http://schemas.microsoft.com/office/powerpoint/2010/main" val="806780358"/>
+        <p14:creationId xmlns:p14="http://schemas.microsoft.com/office/powerpoint/2010/main" val="2049713913"/>
       </p:ext>
     </p:extLst>
   </p:cSld>
@@ -2206,152 +1916,21 @@
               <a:defRPr/>
             </a:pPr>
             <a:r>
-              <a:rPr lang="en-US" sz="1200" b="0" i="0" kern="1200" dirty="0" smtClean="0">
-                <a:solidFill>
-                  <a:schemeClr val="tx1"/>
-                </a:solidFill>
-                <a:effectLst/>
-                <a:latin typeface="+mn-lt"/>
-                <a:ea typeface="+mn-ea"/>
-                <a:cs typeface="+mn-cs"/>
-              </a:rPr>
-              <a:t>A function that is to be executed after another function has finished executing</a:t>
-            </a:r>
-          </a:p>
-          <a:p>
-            <a:pPr marL="171450" marR="0" lvl="2" indent="-171450" algn="l" defTabSz="914400" rtl="0" eaLnBrk="1" fontAlgn="auto" latinLnBrk="0" hangingPunct="1">
-              <a:lnSpc>
-                <a:spcPct val="100000"/>
-              </a:lnSpc>
-              <a:spcBef>
-                <a:spcPts val="0"/>
-              </a:spcBef>
-              <a:spcAft>
-                <a:spcPts val="0"/>
-              </a:spcAft>
-              <a:buClrTx/>
-              <a:buSzTx/>
-              <a:buFont typeface="Arial" charset="0"/>
-              <a:buChar char="•"/>
-              <a:tabLst/>
-              <a:defRPr/>
-            </a:pPr>
-            <a:r>
-              <a:rPr lang="en-US" sz="1200" b="0" i="0" kern="1200" dirty="0" smtClean="0">
-                <a:solidFill>
-                  <a:schemeClr val="tx1"/>
-                </a:solidFill>
-                <a:effectLst/>
-                <a:latin typeface="+mn-lt"/>
-                <a:ea typeface="+mn-ea"/>
-                <a:cs typeface="+mn-cs"/>
-              </a:rPr>
-              <a:t>JavaScript is an event-driven language meaning</a:t>
-            </a:r>
-            <a:r>
-              <a:rPr lang="en-US" sz="1200" b="0" i="0" kern="1200" baseline="0" dirty="0" smtClean="0">
-                <a:solidFill>
-                  <a:schemeClr val="tx1"/>
-                </a:solidFill>
-                <a:effectLst/>
-                <a:latin typeface="+mn-lt"/>
-                <a:ea typeface="+mn-ea"/>
-                <a:cs typeface="+mn-cs"/>
-              </a:rPr>
-              <a:t> that instead of waiting for a response before moving on, JavaScript will keep </a:t>
-            </a:r>
-            <a:r>
-              <a:rPr lang="en-US" sz="1200" b="0" i="0" kern="1200" baseline="0" dirty="0" err="1" smtClean="0">
-                <a:solidFill>
-                  <a:schemeClr val="tx1"/>
-                </a:solidFill>
-                <a:effectLst/>
-                <a:latin typeface="+mn-lt"/>
-                <a:ea typeface="+mn-ea"/>
-                <a:cs typeface="+mn-cs"/>
-              </a:rPr>
-              <a:t>executingwhile</a:t>
-            </a:r>
-            <a:r>
-              <a:rPr lang="en-US" sz="1200" b="0" i="0" kern="1200" baseline="0" dirty="0" smtClean="0">
-                <a:solidFill>
-                  <a:schemeClr val="tx1"/>
-                </a:solidFill>
-                <a:effectLst/>
-                <a:latin typeface="+mn-lt"/>
-                <a:ea typeface="+mn-ea"/>
-                <a:cs typeface="+mn-cs"/>
-              </a:rPr>
-              <a:t> listening to </a:t>
-            </a:r>
-            <a:r>
-              <a:rPr lang="en-US" sz="1200" b="0" i="0" kern="1200" baseline="0" smtClean="0">
-                <a:solidFill>
-                  <a:schemeClr val="tx1"/>
-                </a:solidFill>
-                <a:effectLst/>
-                <a:latin typeface="+mn-lt"/>
-                <a:ea typeface="+mn-ea"/>
-                <a:cs typeface="+mn-cs"/>
-              </a:rPr>
-              <a:t>other events</a:t>
-            </a:r>
-            <a:endParaRPr lang="en-US" sz="1200" b="0" i="0" kern="1200" dirty="0" smtClean="0">
-              <a:solidFill>
-                <a:schemeClr val="tx1"/>
-              </a:solidFill>
-              <a:effectLst/>
-              <a:latin typeface="+mn-lt"/>
-              <a:ea typeface="+mn-ea"/>
-              <a:cs typeface="+mn-cs"/>
-            </a:endParaRPr>
-          </a:p>
-          <a:p>
-            <a:pPr marL="171450" marR="0" lvl="2" indent="-171450" algn="l" defTabSz="914400" rtl="0" eaLnBrk="1" fontAlgn="auto" latinLnBrk="0" hangingPunct="1">
-              <a:lnSpc>
-                <a:spcPct val="100000"/>
-              </a:lnSpc>
-              <a:spcBef>
-                <a:spcPts val="0"/>
-              </a:spcBef>
-              <a:spcAft>
-                <a:spcPts val="0"/>
-              </a:spcAft>
-              <a:buClrTx/>
-              <a:buSzTx/>
-              <a:buFont typeface="Arial" charset="0"/>
-              <a:buChar char="•"/>
-              <a:tabLst/>
-              <a:defRPr/>
-            </a:pPr>
-            <a:endParaRPr lang="en-US" sz="1200" b="0" i="0" kern="1200" dirty="0" smtClean="0">
-              <a:solidFill>
-                <a:schemeClr val="tx1"/>
-              </a:solidFill>
-              <a:effectLst/>
-              <a:latin typeface="+mn-lt"/>
-              <a:ea typeface="+mn-ea"/>
-              <a:cs typeface="+mn-cs"/>
-            </a:endParaRPr>
-          </a:p>
-          <a:p>
-            <a:pPr marL="171450" marR="0" lvl="2" indent="-171450" algn="l" defTabSz="914400" rtl="0" eaLnBrk="1" fontAlgn="auto" latinLnBrk="0" hangingPunct="1">
-              <a:lnSpc>
-                <a:spcPct val="100000"/>
-              </a:lnSpc>
-              <a:spcBef>
-                <a:spcPts val="0"/>
-              </a:spcBef>
-              <a:spcAft>
-                <a:spcPts val="0"/>
-              </a:spcAft>
-              <a:buClrTx/>
-              <a:buSzTx/>
-              <a:buFont typeface="Arial" charset="0"/>
-              <a:buChar char="•"/>
-              <a:tabLst/>
-              <a:defRPr/>
-            </a:pPr>
+              <a:rPr lang="en-US" dirty="0" smtClean="0"/>
+              <a:t>This functionality is</a:t>
+            </a:r>
+            <a:r>
+              <a:rPr lang="en-US" baseline="0" dirty="0" smtClean="0"/>
+              <a:t> f</a:t>
+            </a:r>
+            <a:r>
+              <a:rPr lang="en-US" dirty="0" smtClean="0"/>
+              <a:t>ully dynamic, so for example, you can decide which function to return based off user</a:t>
+            </a:r>
+            <a:r>
+              <a:rPr lang="en-US" baseline="0" dirty="0" smtClean="0"/>
+              <a:t> input</a:t>
+            </a:r>
             <a:endParaRPr lang="en-US" dirty="0" smtClean="0"/>
           </a:p>
         </p:txBody>
@@ -2382,7 +1961,7 @@
     </p:spTree>
     <p:extLst>
       <p:ext uri="{BB962C8B-B14F-4D97-AF65-F5344CB8AC3E}">
-        <p14:creationId xmlns:p14="http://schemas.microsoft.com/office/powerpoint/2010/main" val="2049713913"/>
+        <p14:creationId xmlns:p14="http://schemas.microsoft.com/office/powerpoint/2010/main" val="163316607"/>
       </p:ext>
     </p:extLst>
   </p:cSld>
@@ -2455,19 +2034,103 @@
             </a:pPr>
             <a:r>
               <a:rPr lang="en-US" dirty="0" smtClean="0"/>
-              <a:t>This functionality is</a:t>
+              <a:t>Applies the function to each element of the sequence and returns a new sequence (of type map) consisting</a:t>
             </a:r>
             <a:r>
               <a:rPr lang="en-US" baseline="0" dirty="0" smtClean="0"/>
-              <a:t> f</a:t>
-            </a:r>
-            <a:r>
-              <a:rPr lang="en-US" dirty="0" smtClean="0"/>
-              <a:t>ully dynamic, so for example, you can decide which function to return based off user</a:t>
-            </a:r>
+              <a:t> of all the results</a:t>
+            </a:r>
+          </a:p>
+          <a:p>
+            <a:pPr marL="171450" marR="0" lvl="2" indent="-171450" algn="l" defTabSz="914400" rtl="0" eaLnBrk="1" fontAlgn="auto" latinLnBrk="0" hangingPunct="1">
+              <a:lnSpc>
+                <a:spcPct val="100000"/>
+              </a:lnSpc>
+              <a:spcBef>
+                <a:spcPts val="0"/>
+              </a:spcBef>
+              <a:spcAft>
+                <a:spcPts val="0"/>
+              </a:spcAft>
+              <a:buClrTx/>
+              <a:buSzTx/>
+              <a:buFont typeface="Arial" charset="0"/>
+              <a:buChar char="•"/>
+              <a:tabLst/>
+              <a:defRPr/>
+            </a:pPr>
             <a:r>
               <a:rPr lang="en-US" baseline="0" dirty="0" smtClean="0"/>
-              <a:t> input</a:t>
+              <a:t>Map returns a map object which is technically an iterator, not a list, so print wants it to be converted to a list</a:t>
+            </a:r>
+          </a:p>
+          <a:p>
+            <a:pPr marL="171450" marR="0" lvl="2" indent="-171450" algn="l" defTabSz="914400" rtl="0" eaLnBrk="1" fontAlgn="auto" latinLnBrk="0" hangingPunct="1">
+              <a:lnSpc>
+                <a:spcPct val="100000"/>
+              </a:lnSpc>
+              <a:spcBef>
+                <a:spcPts val="0"/>
+              </a:spcBef>
+              <a:spcAft>
+                <a:spcPts val="0"/>
+              </a:spcAft>
+              <a:buClrTx/>
+              <a:buSzTx/>
+              <a:buFont typeface="Arial" charset="0"/>
+              <a:buChar char="•"/>
+              <a:tabLst/>
+              <a:defRPr/>
+            </a:pPr>
+            <a:r>
+              <a:rPr lang="en-US" baseline="0" dirty="0" smtClean="0"/>
+              <a:t>If you don’t cast list, the system prints “map object”</a:t>
+            </a:r>
+          </a:p>
+          <a:p>
+            <a:pPr marL="171450" marR="0" lvl="2" indent="-171450" algn="l" defTabSz="914400" rtl="0" eaLnBrk="1" fontAlgn="auto" latinLnBrk="0" hangingPunct="1">
+              <a:lnSpc>
+                <a:spcPct val="100000"/>
+              </a:lnSpc>
+              <a:spcBef>
+                <a:spcPts val="0"/>
+              </a:spcBef>
+              <a:spcAft>
+                <a:spcPts val="0"/>
+              </a:spcAft>
+              <a:buClrTx/>
+              <a:buSzTx/>
+              <a:buFont typeface="Arial" charset="0"/>
+              <a:buChar char="•"/>
+              <a:tabLst/>
+              <a:defRPr/>
+            </a:pPr>
+            <a:r>
+              <a:rPr lang="en-US" baseline="0" dirty="0" smtClean="0"/>
+              <a:t>Map replaces the traditional for-loop that you would do in most languages</a:t>
+            </a:r>
+          </a:p>
+          <a:p>
+            <a:pPr marL="171450" marR="0" lvl="2" indent="-171450" algn="l" defTabSz="914400" rtl="0" eaLnBrk="1" fontAlgn="auto" latinLnBrk="0" hangingPunct="1">
+              <a:lnSpc>
+                <a:spcPct val="100000"/>
+              </a:lnSpc>
+              <a:spcBef>
+                <a:spcPts val="0"/>
+              </a:spcBef>
+              <a:spcAft>
+                <a:spcPts val="0"/>
+              </a:spcAft>
+              <a:buClrTx/>
+              <a:buSzTx/>
+              <a:buFont typeface="Arial" charset="0"/>
+              <a:buChar char="•"/>
+              <a:tabLst/>
+              <a:defRPr/>
+            </a:pPr>
+            <a:r>
+              <a:rPr lang="en-US" baseline="0" dirty="0" smtClean="0"/>
+              <a:t>The result of map can be used as the input to other functions that are expecting a sequence</a:t>
             </a:r>
             <a:endParaRPr lang="en-US" dirty="0" smtClean="0"/>
           </a:p>
@@ -2499,7 +2162,7 @@
     </p:spTree>
     <p:extLst>
       <p:ext uri="{BB962C8B-B14F-4D97-AF65-F5344CB8AC3E}">
-        <p14:creationId xmlns:p14="http://schemas.microsoft.com/office/powerpoint/2010/main" val="163316607"/>
+        <p14:creationId xmlns:p14="http://schemas.microsoft.com/office/powerpoint/2010/main" val="299381230"/>
       </p:ext>
     </p:extLst>
   </p:cSld>
@@ -2572,11 +2235,11 @@
             </a:pPr>
             <a:r>
               <a:rPr lang="en-US" dirty="0" smtClean="0"/>
-              <a:t>Applies the function to each element of the sequence and returns a new sequence (of type map) consisting</a:t>
+              <a:t>You can easily implement</a:t>
             </a:r>
             <a:r>
               <a:rPr lang="en-US" baseline="0" dirty="0" smtClean="0"/>
-              <a:t> of all the results</a:t>
+              <a:t> the filter functionaility in an imperative language, but it would be much more verbose</a:t>
             </a:r>
           </a:p>
           <a:p>
@@ -2599,7 +2262,7 @@
             </a:pPr>
             <a:r>
               <a:rPr lang="en-US" baseline="0" dirty="0" smtClean="0"/>
-              <a:t>Map returns a map object which is technically an iterator, not a list, so print wants it to be converted to a list</a:t>
+              <a:t>We can use map and filter together</a:t>
             </a:r>
           </a:p>
           <a:p>
@@ -2622,7 +2285,7 @@
             </a:pPr>
             <a:r>
               <a:rPr lang="en-US" baseline="0" dirty="0" smtClean="0"/>
-              <a:t>If you don’t cast list, the system prints “map object”</a:t>
+              <a:t>In FP, we don’t want intermediate state so we try to think of the whole process as just a pipeline of calls</a:t>
             </a:r>
           </a:p>
           <a:p>
@@ -2645,7 +2308,7 @@
             </a:pPr>
             <a:r>
               <a:rPr lang="en-US" baseline="0" dirty="0" smtClean="0"/>
-              <a:t>Map replaces the traditional for-loop that you would do in most languages</a:t>
+              <a:t>Note that this style makes FP code, in general, much harder to read than imperative code</a:t>
             </a:r>
           </a:p>
           <a:p>
@@ -2668,7 +2331,7 @@
             </a:pPr>
             <a:r>
               <a:rPr lang="en-US" baseline="0" dirty="0" smtClean="0"/>
-              <a:t>The result of map can be used as the input to other functions that are expecting a sequence</a:t>
+              <a:t>Code commenting becomes even more essential</a:t>
             </a:r>
             <a:endParaRPr lang="en-US" dirty="0" smtClean="0"/>
           </a:p>
@@ -2700,7 +2363,7 @@
     </p:spTree>
     <p:extLst>
       <p:ext uri="{BB962C8B-B14F-4D97-AF65-F5344CB8AC3E}">
-        <p14:creationId xmlns:p14="http://schemas.microsoft.com/office/powerpoint/2010/main" val="299381230"/>
+        <p14:creationId xmlns:p14="http://schemas.microsoft.com/office/powerpoint/2010/main" val="141130767"/>
       </p:ext>
     </p:extLst>
   </p:cSld>
@@ -2773,11 +2436,11 @@
             </a:pPr>
             <a:r>
               <a:rPr lang="en-US" dirty="0" smtClean="0"/>
-              <a:t>You can easily implement</a:t>
+              <a:t>In Python3,</a:t>
             </a:r>
             <a:r>
               <a:rPr lang="en-US" baseline="0" dirty="0" smtClean="0"/>
-              <a:t> the filter functionaility in an imperative language, but it would be much more verbose</a:t>
+              <a:t> reduce has been removed from the main library</a:t>
             </a:r>
           </a:p>
           <a:p>
@@ -2800,76 +2463,7 @@
             </a:pPr>
             <a:r>
               <a:rPr lang="en-US" baseline="0" dirty="0" smtClean="0"/>
-              <a:t>We can use map and filter together</a:t>
-            </a:r>
-          </a:p>
-          <a:p>
-            <a:pPr marL="171450" marR="0" lvl="2" indent="-171450" algn="l" defTabSz="914400" rtl="0" eaLnBrk="1" fontAlgn="auto" latinLnBrk="0" hangingPunct="1">
-              <a:lnSpc>
-                <a:spcPct val="100000"/>
-              </a:lnSpc>
-              <a:spcBef>
-                <a:spcPts val="0"/>
-              </a:spcBef>
-              <a:spcAft>
-                <a:spcPts val="0"/>
-              </a:spcAft>
-              <a:buClrTx/>
-              <a:buSzTx/>
-              <a:buFont typeface="Arial" charset="0"/>
-              <a:buChar char="•"/>
-              <a:tabLst/>
-              <a:defRPr/>
-            </a:pPr>
-            <a:r>
-              <a:rPr lang="en-US" baseline="0" dirty="0" smtClean="0"/>
-              <a:t>In FP, we don’t want intermediate state so we try to think of the whole process as just a pipeline of calls</a:t>
-            </a:r>
-          </a:p>
-          <a:p>
-            <a:pPr marL="171450" marR="0" lvl="2" indent="-171450" algn="l" defTabSz="914400" rtl="0" eaLnBrk="1" fontAlgn="auto" latinLnBrk="0" hangingPunct="1">
-              <a:lnSpc>
-                <a:spcPct val="100000"/>
-              </a:lnSpc>
-              <a:spcBef>
-                <a:spcPts val="0"/>
-              </a:spcBef>
-              <a:spcAft>
-                <a:spcPts val="0"/>
-              </a:spcAft>
-              <a:buClrTx/>
-              <a:buSzTx/>
-              <a:buFont typeface="Arial" charset="0"/>
-              <a:buChar char="•"/>
-              <a:tabLst/>
-              <a:defRPr/>
-            </a:pPr>
-            <a:r>
-              <a:rPr lang="en-US" baseline="0" dirty="0" smtClean="0"/>
-              <a:t>Note that this style makes FP code, in general, much harder to read than imperative code</a:t>
-            </a:r>
-          </a:p>
-          <a:p>
-            <a:pPr marL="171450" marR="0" lvl="2" indent="-171450" algn="l" defTabSz="914400" rtl="0" eaLnBrk="1" fontAlgn="auto" latinLnBrk="0" hangingPunct="1">
-              <a:lnSpc>
-                <a:spcPct val="100000"/>
-              </a:lnSpc>
-              <a:spcBef>
-                <a:spcPts val="0"/>
-              </a:spcBef>
-              <a:spcAft>
-                <a:spcPts val="0"/>
-              </a:spcAft>
-              <a:buClrTx/>
-              <a:buSzTx/>
-              <a:buFont typeface="Arial" charset="0"/>
-              <a:buChar char="•"/>
-              <a:tabLst/>
-              <a:defRPr/>
-            </a:pPr>
-            <a:r>
-              <a:rPr lang="en-US" baseline="0" dirty="0" smtClean="0"/>
-              <a:t>Code commenting becomes even more essential</a:t>
+              <a:t>Use functools library instead. This should go at the top of your file</a:t>
             </a:r>
             <a:endParaRPr lang="en-US" dirty="0" smtClean="0"/>
           </a:p>
@@ -2901,7 +2495,7 @@
     </p:spTree>
     <p:extLst>
       <p:ext uri="{BB962C8B-B14F-4D97-AF65-F5344CB8AC3E}">
-        <p14:creationId xmlns:p14="http://schemas.microsoft.com/office/powerpoint/2010/main" val="141130767"/>
+        <p14:creationId xmlns:p14="http://schemas.microsoft.com/office/powerpoint/2010/main" val="673408328"/>
       </p:ext>
     </p:extLst>
   </p:cSld>
@@ -5937,204 +5531,6 @@
         <p:spPr>
           <a:xfrm>
             <a:off x="0" y="1299607"/>
-            <a:ext cx="12192000" cy="2800767"/>
-          </a:xfrm>
-          <a:prstGeom prst="rect">
-            <a:avLst/>
-          </a:prstGeom>
-          <a:noFill/>
-        </p:spPr>
-        <p:txBody>
-          <a:bodyPr wrap="square" lIns="91440" tIns="45720" rIns="91440" bIns="45720">
-            <a:spAutoFit/>
-          </a:bodyPr>
-          <a:lstStyle/>
-          <a:p>
-            <a:r>
-              <a:rPr lang="en-US" sz="3800" dirty="0" smtClean="0"/>
-              <a:t>	</a:t>
-            </a:r>
-            <a:r>
-              <a:rPr lang="en-US" sz="3800" b="1" dirty="0" smtClean="0"/>
-              <a:t>Reduce</a:t>
-            </a:r>
-          </a:p>
-          <a:p>
-            <a:endParaRPr lang="en-US" sz="3800" b="1" dirty="0"/>
-          </a:p>
-          <a:p>
-            <a:pPr marL="1485900" lvl="2" indent="-571500">
-              <a:buFont typeface="Arial" charset="0"/>
-              <a:buChar char="•"/>
-            </a:pPr>
-            <a:r>
-              <a:rPr lang="en-US" sz="2500" dirty="0"/>
-              <a:t>Takes a </a:t>
-            </a:r>
-            <a:r>
-              <a:rPr lang="en-US" sz="2500" dirty="0" smtClean="0"/>
-              <a:t>function </a:t>
-            </a:r>
-            <a:r>
-              <a:rPr lang="en-US" sz="2500" dirty="0"/>
-              <a:t>and a sequence</a:t>
-            </a:r>
-          </a:p>
-          <a:p>
-            <a:pPr marL="1485900" lvl="2" indent="-571500">
-              <a:buFont typeface="Arial" charset="0"/>
-              <a:buChar char="•"/>
-            </a:pPr>
-            <a:r>
-              <a:rPr lang="en-US" sz="2500" dirty="0"/>
-              <a:t>F</a:t>
-            </a:r>
-            <a:r>
-              <a:rPr lang="en-US" sz="2500" dirty="0" smtClean="0"/>
-              <a:t>unction is applied to items one and two of the sequence</a:t>
-            </a:r>
-          </a:p>
-          <a:p>
-            <a:pPr marL="1485900" lvl="2" indent="-571500">
-              <a:buFont typeface="Arial" charset="0"/>
-              <a:buChar char="•"/>
-            </a:pPr>
-            <a:r>
-              <a:rPr lang="en-US" sz="2500" dirty="0" smtClean="0"/>
-              <a:t>Function is then applied to the result of that step and item three</a:t>
-            </a:r>
-            <a:r>
-              <a:rPr lang="mr-IN" sz="2500" dirty="0" smtClean="0"/>
-              <a:t>…</a:t>
-            </a:r>
-            <a:r>
-              <a:rPr lang="en-AU" sz="2500" dirty="0" smtClean="0"/>
-              <a:t>so on</a:t>
-            </a:r>
-          </a:p>
-          <a:p>
-            <a:pPr marL="1485900" lvl="2" indent="-571500">
-              <a:buFont typeface="Arial" charset="0"/>
-              <a:buChar char="•"/>
-            </a:pPr>
-            <a:r>
-              <a:rPr lang="en-AU" sz="2500" dirty="0" smtClean="0"/>
-              <a:t>At the end, only one value remains</a:t>
-            </a:r>
-            <a:endParaRPr lang="en-US" sz="2500" dirty="0" smtClean="0"/>
-          </a:p>
-        </p:txBody>
-      </p:sp>
-      <p:pic>
-        <p:nvPicPr>
-          <p:cNvPr id="2" name="Picture 1"/>
-          <p:cNvPicPr>
-            <a:picLocks noChangeAspect="1"/>
-          </p:cNvPicPr>
-          <p:nvPr/>
-        </p:nvPicPr>
-        <p:blipFill>
-          <a:blip r:embed="rId3">
-            <a:extLst>
-              <a:ext uri="{28A0092B-C50C-407E-A947-70E740481C1C}">
-                <a14:useLocalDpi xmlns:a14="http://schemas.microsoft.com/office/drawing/2010/main" val="0"/>
-              </a:ext>
-            </a:extLst>
-          </a:blip>
-          <a:stretch>
-            <a:fillRect/>
-          </a:stretch>
-        </p:blipFill>
-        <p:spPr>
-          <a:xfrm>
-            <a:off x="6997362" y="3878840"/>
-            <a:ext cx="3226475" cy="2660072"/>
-          </a:xfrm>
-          <a:prstGeom prst="rect">
-            <a:avLst/>
-          </a:prstGeom>
-        </p:spPr>
-      </p:pic>
-    </p:spTree>
-    <p:extLst>
-      <p:ext uri="{BB962C8B-B14F-4D97-AF65-F5344CB8AC3E}">
-        <p14:creationId xmlns:p14="http://schemas.microsoft.com/office/powerpoint/2010/main" val="1666585507"/>
-      </p:ext>
-    </p:extLst>
-  </p:cSld>
-  <p:clrMapOvr>
-    <a:masterClrMapping/>
-  </p:clrMapOvr>
-  <p:timing>
-    <p:tnLst>
-      <p:par>
-        <p:cTn id="1" dur="indefinite" restart="never" nodeType="tmRoot"/>
-      </p:par>
-    </p:tnLst>
-  </p:timing>
-</p:sld>
-</file>
-
-<file path=ppt/slides/slide11.xml><?xml version="1.0" encoding="utf-8"?>
-<p:sld xmlns:a="http://schemas.openxmlformats.org/drawingml/2006/main" xmlns:r="http://schemas.openxmlformats.org/officeDocument/2006/relationships" xmlns:p="http://schemas.openxmlformats.org/presentationml/2006/main">
-  <p:cSld>
-    <p:bg>
-      <p:bgPr>
-        <a:solidFill>
-          <a:schemeClr val="accent5">
-            <a:lumMod val="60000"/>
-            <a:lumOff val="40000"/>
-          </a:schemeClr>
-        </a:solidFill>
-        <a:effectLst/>
-      </p:bgPr>
-    </p:bg>
-    <p:spTree>
-      <p:nvGrpSpPr>
-        <p:cNvPr id="1" name=""/>
-        <p:cNvGrpSpPr/>
-        <p:nvPr/>
-      </p:nvGrpSpPr>
-      <p:grpSpPr>
-        <a:xfrm>
-          <a:off x="0" y="0"/>
-          <a:ext cx="0" cy="0"/>
-          <a:chOff x="0" y="0"/>
-          <a:chExt cx="0" cy="0"/>
-        </a:xfrm>
-      </p:grpSpPr>
-      <p:sp>
-        <p:nvSpPr>
-          <p:cNvPr id="9" name="Slide Number Placeholder 8"/>
-          <p:cNvSpPr>
-            <a:spLocks noGrp="1"/>
-          </p:cNvSpPr>
-          <p:nvPr>
-            <p:ph type="sldNum" sz="quarter" idx="12"/>
-          </p:nvPr>
-        </p:nvSpPr>
-        <p:spPr/>
-        <p:txBody>
-          <a:bodyPr/>
-          <a:lstStyle/>
-          <a:p>
-            <a:fld id="{B822FDE6-25CA-0444-94EE-C6FC8C5EFEB8}" type="slidenum">
-              <a:rPr lang="en-US" smtClean="0"/>
-              <a:t>11</a:t>
-            </a:fld>
-            <a:endParaRPr lang="en-US"/>
-          </a:p>
-        </p:txBody>
-      </p:sp>
-      <p:sp>
-        <p:nvSpPr>
-          <p:cNvPr id="4" name="Rectangle 3"/>
-          <p:cNvSpPr/>
-          <p:nvPr/>
-        </p:nvSpPr>
-        <p:spPr>
-          <a:xfrm>
-            <a:off x="0" y="1299607"/>
             <a:ext cx="12192000" cy="2846933"/>
           </a:xfrm>
           <a:prstGeom prst="rect">
@@ -6269,7 +5665,7 @@
 </p:sld>
 </file>
 
-<file path=ppt/slides/slide12.xml><?xml version="1.0" encoding="utf-8"?>
+<file path=ppt/slides/slide11.xml><?xml version="1.0" encoding="utf-8"?>
 <p:sld xmlns:a="http://schemas.openxmlformats.org/drawingml/2006/main" xmlns:r="http://schemas.openxmlformats.org/officeDocument/2006/relationships" xmlns:p="http://schemas.openxmlformats.org/presentationml/2006/main">
   <p:cSld>
     <p:bg>
@@ -6314,7 +5710,7 @@
           <a:p>
             <a:fld id="{B822FDE6-25CA-0444-94EE-C6FC8C5EFEB8}" type="slidenum">
               <a:rPr lang="en-US" smtClean="0"/>
-              <a:t>12</a:t>
+              <a:t>11</a:t>
             </a:fld>
             <a:endParaRPr lang="en-US"/>
           </a:p>
@@ -6462,7 +5858,7 @@
 </p:sld>
 </file>
 
-<file path=ppt/slides/slide13.xml><?xml version="1.0" encoding="utf-8"?>
+<file path=ppt/slides/slide12.xml><?xml version="1.0" encoding="utf-8"?>
 <p:sld xmlns:a="http://schemas.openxmlformats.org/drawingml/2006/main" xmlns:r="http://schemas.openxmlformats.org/officeDocument/2006/relationships" xmlns:p="http://schemas.openxmlformats.org/presentationml/2006/main">
   <p:cSld>
     <p:bg>
@@ -6507,200 +5903,7 @@
           <a:p>
             <a:fld id="{B822FDE6-25CA-0444-94EE-C6FC8C5EFEB8}" type="slidenum">
               <a:rPr lang="en-US" smtClean="0"/>
-              <a:t>13</a:t>
-            </a:fld>
-            <a:endParaRPr lang="en-US"/>
-          </a:p>
-        </p:txBody>
-      </p:sp>
-      <p:sp>
-        <p:nvSpPr>
-          <p:cNvPr id="4" name="Rectangle 3"/>
-          <p:cNvSpPr/>
-          <p:nvPr/>
-        </p:nvSpPr>
-        <p:spPr>
-          <a:xfrm>
-            <a:off x="0" y="1299607"/>
-            <a:ext cx="12192000" cy="2800767"/>
-          </a:xfrm>
-          <a:prstGeom prst="rect">
-            <a:avLst/>
-          </a:prstGeom>
-          <a:noFill/>
-        </p:spPr>
-        <p:txBody>
-          <a:bodyPr wrap="square" lIns="91440" tIns="45720" rIns="91440" bIns="45720">
-            <a:spAutoFit/>
-          </a:bodyPr>
-          <a:lstStyle/>
-          <a:p>
-            <a:r>
-              <a:rPr lang="en-US" sz="3800" dirty="0" smtClean="0"/>
-              <a:t>	</a:t>
-            </a:r>
-            <a:r>
-              <a:rPr lang="en-US" sz="3800" b="1" dirty="0" smtClean="0"/>
-              <a:t>Lambda</a:t>
-            </a:r>
-          </a:p>
-          <a:p>
-            <a:endParaRPr lang="en-US" sz="3800" b="1" dirty="0"/>
-          </a:p>
-          <a:p>
-            <a:pPr marL="1485900" lvl="2" indent="-571500">
-              <a:buFont typeface="Arial" charset="0"/>
-              <a:buChar char="•"/>
-            </a:pPr>
-            <a:r>
-              <a:rPr lang="en-US" sz="2500" dirty="0" smtClean="0"/>
-              <a:t>Functions are defined anonymously</a:t>
-            </a:r>
-          </a:p>
-          <a:p>
-            <a:pPr marL="1485900" lvl="2" indent="-571500">
-              <a:buFont typeface="Arial" charset="0"/>
-              <a:buChar char="•"/>
-            </a:pPr>
-            <a:r>
-              <a:rPr lang="en-US" sz="2500" dirty="0" smtClean="0"/>
-              <a:t>Lambda syntax </a:t>
-            </a:r>
-            <a:r>
-              <a:rPr lang="mr-IN" sz="2500" dirty="0" smtClean="0"/>
-              <a:t>–</a:t>
-            </a:r>
-            <a:r>
-              <a:rPr lang="en-US" sz="2500" dirty="0" smtClean="0"/>
-              <a:t> lambda calculus</a:t>
-            </a:r>
-          </a:p>
-          <a:p>
-            <a:pPr marL="1485900" lvl="2" indent="-571500">
-              <a:buFont typeface="Arial" charset="0"/>
-              <a:buChar char="•"/>
-            </a:pPr>
-            <a:r>
-              <a:rPr lang="en-US" sz="2500" dirty="0" smtClean="0"/>
-              <a:t>Lambda sequence </a:t>
-            </a:r>
-            <a:r>
-              <a:rPr lang="mr-IN" sz="2500" dirty="0" smtClean="0"/>
-              <a:t>–</a:t>
-            </a:r>
-            <a:r>
-              <a:rPr lang="en-US" sz="2500" dirty="0" smtClean="0"/>
-              <a:t> variables: function code (with implicit return)</a:t>
-            </a:r>
-          </a:p>
-          <a:p>
-            <a:pPr marL="1485900" lvl="2" indent="-571500">
-              <a:buFont typeface="Arial" charset="0"/>
-              <a:buChar char="•"/>
-            </a:pPr>
-            <a:r>
-              <a:rPr lang="en-US" sz="2500" dirty="0" smtClean="0"/>
-              <a:t>No def keyword</a:t>
-            </a:r>
-          </a:p>
-        </p:txBody>
-      </p:sp>
-      <p:pic>
-        <p:nvPicPr>
-          <p:cNvPr id="2" name="Picture 1"/>
-          <p:cNvPicPr>
-            <a:picLocks noChangeAspect="1"/>
-          </p:cNvPicPr>
-          <p:nvPr/>
-        </p:nvPicPr>
-        <p:blipFill>
-          <a:blip r:embed="rId3">
-            <a:extLst>
-              <a:ext uri="{28A0092B-C50C-407E-A947-70E740481C1C}">
-                <a14:useLocalDpi xmlns:a14="http://schemas.microsoft.com/office/drawing/2010/main" val="0"/>
-              </a:ext>
-            </a:extLst>
-          </a:blip>
-          <a:stretch>
-            <a:fillRect/>
-          </a:stretch>
-        </p:blipFill>
-        <p:spPr>
-          <a:xfrm>
-            <a:off x="7615381" y="1504373"/>
-            <a:ext cx="2933700" cy="1384300"/>
-          </a:xfrm>
-          <a:prstGeom prst="rect">
-            <a:avLst/>
-          </a:prstGeom>
-        </p:spPr>
-      </p:pic>
-    </p:spTree>
-    <p:extLst>
-      <p:ext uri="{BB962C8B-B14F-4D97-AF65-F5344CB8AC3E}">
-        <p14:creationId xmlns:p14="http://schemas.microsoft.com/office/powerpoint/2010/main" val="1427017016"/>
-      </p:ext>
-    </p:extLst>
-  </p:cSld>
-  <p:clrMapOvr>
-    <a:masterClrMapping/>
-  </p:clrMapOvr>
-  <p:timing>
-    <p:tnLst>
-      <p:par>
-        <p:cTn id="1" dur="indefinite" restart="never" nodeType="tmRoot"/>
-      </p:par>
-    </p:tnLst>
-  </p:timing>
-</p:sld>
-</file>
-
-<file path=ppt/slides/slide14.xml><?xml version="1.0" encoding="utf-8"?>
-<p:sld xmlns:a="http://schemas.openxmlformats.org/drawingml/2006/main" xmlns:r="http://schemas.openxmlformats.org/officeDocument/2006/relationships" xmlns:p="http://schemas.openxmlformats.org/presentationml/2006/main">
-  <p:cSld>
-    <p:bg>
-      <p:bgPr>
-        <a:solidFill>
-          <a:schemeClr val="accent5">
-            <a:lumMod val="60000"/>
-            <a:lumOff val="40000"/>
-          </a:schemeClr>
-        </a:solidFill>
-        <a:effectLst/>
-      </p:bgPr>
-    </p:bg>
-    <p:spTree>
-      <p:nvGrpSpPr>
-        <p:cNvPr id="1" name=""/>
-        <p:cNvGrpSpPr/>
-        <p:nvPr/>
-      </p:nvGrpSpPr>
-      <p:grpSpPr>
-        <a:xfrm>
-          <a:off x="0" y="0"/>
-          <a:ext cx="0" cy="0"/>
-          <a:chOff x="0" y="0"/>
-          <a:chExt cx="0" cy="0"/>
-        </a:xfrm>
-      </p:grpSpPr>
-      <p:sp>
-        <p:nvSpPr>
-          <p:cNvPr id="9" name="Slide Number Placeholder 8"/>
-          <p:cNvSpPr>
-            <a:spLocks noGrp="1"/>
-          </p:cNvSpPr>
-          <p:nvPr>
-            <p:ph type="sldNum" sz="quarter" idx="12"/>
-          </p:nvPr>
-        </p:nvSpPr>
-        <p:spPr/>
-        <p:txBody>
-          <a:bodyPr/>
-          <a:lstStyle/>
-          <a:p>
-            <a:fld id="{B822FDE6-25CA-0444-94EE-C6FC8C5EFEB8}" type="slidenum">
-              <a:rPr lang="en-US" smtClean="0"/>
-              <a:t>14</a:t>
+              <a:t>12</a:t>
             </a:fld>
             <a:endParaRPr lang="en-US"/>
           </a:p>
@@ -6869,7 +6072,7 @@
 </p:sld>
 </file>
 
-<file path=ppt/slides/slide15.xml><?xml version="1.0" encoding="utf-8"?>
+<file path=ppt/slides/slide13.xml><?xml version="1.0" encoding="utf-8"?>
 <p:sld xmlns:a="http://schemas.openxmlformats.org/drawingml/2006/main" xmlns:r="http://schemas.openxmlformats.org/officeDocument/2006/relationships" xmlns:p="http://schemas.openxmlformats.org/presentationml/2006/main">
   <p:cSld>
     <p:bg>
@@ -6914,7 +6117,7 @@
           <a:p>
             <a:fld id="{B822FDE6-25CA-0444-94EE-C6FC8C5EFEB8}" type="slidenum">
               <a:rPr lang="en-US" smtClean="0"/>
-              <a:t>15</a:t>
+              <a:t>13</a:t>
             </a:fld>
             <a:endParaRPr lang="en-US"/>
           </a:p>
@@ -7165,7 +6368,7 @@
               <a:buChar char="•"/>
             </a:pPr>
             <a:r>
-              <a:rPr lang="en-US" sz="2000" smtClean="0"/>
+              <a:rPr lang="en-US" sz="2000" dirty="0" smtClean="0"/>
               <a:t>Partials/Closures</a:t>
             </a:r>
             <a:endParaRPr lang="en-US" sz="2500" dirty="0" smtClean="0"/>
@@ -7726,163 +6929,6 @@
         </p:blipFill>
         <p:spPr>
           <a:xfrm>
-            <a:off x="6584950" y="1427655"/>
-            <a:ext cx="3136900" cy="4318000"/>
-          </a:xfrm>
-          <a:prstGeom prst="rect">
-            <a:avLst/>
-          </a:prstGeom>
-        </p:spPr>
-      </p:pic>
-    </p:spTree>
-    <p:extLst>
-      <p:ext uri="{BB962C8B-B14F-4D97-AF65-F5344CB8AC3E}">
-        <p14:creationId xmlns:p14="http://schemas.microsoft.com/office/powerpoint/2010/main" val="1501893828"/>
-      </p:ext>
-    </p:extLst>
-  </p:cSld>
-  <p:clrMapOvr>
-    <a:masterClrMapping/>
-  </p:clrMapOvr>
-  <p:timing>
-    <p:tnLst>
-      <p:par>
-        <p:cTn id="1" dur="indefinite" restart="never" nodeType="tmRoot"/>
-      </p:par>
-    </p:tnLst>
-  </p:timing>
-</p:sld>
-</file>
-
-<file path=ppt/slides/slide6.xml><?xml version="1.0" encoding="utf-8"?>
-<p:sld xmlns:a="http://schemas.openxmlformats.org/drawingml/2006/main" xmlns:r="http://schemas.openxmlformats.org/officeDocument/2006/relationships" xmlns:p="http://schemas.openxmlformats.org/presentationml/2006/main">
-  <p:cSld>
-    <p:bg>
-      <p:bgPr>
-        <a:solidFill>
-          <a:schemeClr val="accent5">
-            <a:lumMod val="60000"/>
-            <a:lumOff val="40000"/>
-          </a:schemeClr>
-        </a:solidFill>
-        <a:effectLst/>
-      </p:bgPr>
-    </p:bg>
-    <p:spTree>
-      <p:nvGrpSpPr>
-        <p:cNvPr id="1" name=""/>
-        <p:cNvGrpSpPr/>
-        <p:nvPr/>
-      </p:nvGrpSpPr>
-      <p:grpSpPr>
-        <a:xfrm>
-          <a:off x="0" y="0"/>
-          <a:ext cx="0" cy="0"/>
-          <a:chOff x="0" y="0"/>
-          <a:chExt cx="0" cy="0"/>
-        </a:xfrm>
-      </p:grpSpPr>
-      <p:sp>
-        <p:nvSpPr>
-          <p:cNvPr id="9" name="Slide Number Placeholder 8"/>
-          <p:cNvSpPr>
-            <a:spLocks noGrp="1"/>
-          </p:cNvSpPr>
-          <p:nvPr>
-            <p:ph type="sldNum" sz="quarter" idx="12"/>
-          </p:nvPr>
-        </p:nvSpPr>
-        <p:spPr/>
-        <p:txBody>
-          <a:bodyPr/>
-          <a:lstStyle/>
-          <a:p>
-            <a:fld id="{B822FDE6-25CA-0444-94EE-C6FC8C5EFEB8}" type="slidenum">
-              <a:rPr lang="en-US" smtClean="0"/>
-              <a:t>6</a:t>
-            </a:fld>
-            <a:endParaRPr lang="en-US"/>
-          </a:p>
-        </p:txBody>
-      </p:sp>
-      <p:sp>
-        <p:nvSpPr>
-          <p:cNvPr id="4" name="Rectangle 3"/>
-          <p:cNvSpPr/>
-          <p:nvPr/>
-        </p:nvSpPr>
-        <p:spPr>
-          <a:xfrm>
-            <a:off x="0" y="1299607"/>
-            <a:ext cx="12192000" cy="2031325"/>
-          </a:xfrm>
-          <a:prstGeom prst="rect">
-            <a:avLst/>
-          </a:prstGeom>
-          <a:noFill/>
-        </p:spPr>
-        <p:txBody>
-          <a:bodyPr wrap="square" lIns="91440" tIns="45720" rIns="91440" bIns="45720">
-            <a:spAutoFit/>
-          </a:bodyPr>
-          <a:lstStyle/>
-          <a:p>
-            <a:r>
-              <a:rPr lang="en-US" sz="3800" dirty="0" smtClean="0"/>
-              <a:t>	</a:t>
-            </a:r>
-            <a:r>
-              <a:rPr lang="en-US" sz="3800" b="1" dirty="0" smtClean="0"/>
-              <a:t>Functions as objects</a:t>
-            </a:r>
-          </a:p>
-          <a:p>
-            <a:endParaRPr lang="en-US" sz="3800" b="1" dirty="0"/>
-          </a:p>
-          <a:p>
-            <a:pPr marL="1485900" lvl="2" indent="-571500">
-              <a:buFont typeface="Arial" charset="0"/>
-              <a:buChar char="•"/>
-            </a:pPr>
-            <a:r>
-              <a:rPr lang="en-US" sz="2500" dirty="0" smtClean="0"/>
-              <a:t>Callbacks</a:t>
-            </a:r>
-          </a:p>
-          <a:p>
-            <a:pPr marL="1485900" lvl="2" indent="-571500">
-              <a:buFont typeface="Arial" charset="0"/>
-              <a:buChar char="•"/>
-            </a:pPr>
-            <a:r>
-              <a:rPr lang="en-US" sz="2500" dirty="0" smtClean="0"/>
-              <a:t>Event-driven</a:t>
-            </a:r>
-          </a:p>
-        </p:txBody>
-      </p:sp>
-      <p:pic>
-        <p:nvPicPr>
-          <p:cNvPr id="3" name="Picture 2"/>
-          <p:cNvPicPr>
-            <a:picLocks noChangeAspect="1"/>
-          </p:cNvPicPr>
-          <p:nvPr/>
-        </p:nvPicPr>
-        <p:blipFill>
-          <a:blip r:embed="rId3">
-            <a:extLst>
-              <a:ext uri="{28A0092B-C50C-407E-A947-70E740481C1C}">
-                <a14:useLocalDpi xmlns:a14="http://schemas.microsoft.com/office/drawing/2010/main" val="0"/>
-              </a:ext>
-            </a:extLst>
-          </a:blip>
-          <a:stretch>
-            <a:fillRect/>
-          </a:stretch>
-        </p:blipFill>
-        <p:spPr>
-          <a:xfrm>
             <a:off x="7542210" y="696672"/>
             <a:ext cx="2136780" cy="2941317"/>
           </a:xfrm>
@@ -7941,7 +6987,7 @@
 </p:sld>
 </file>
 
-<file path=ppt/slides/slide7.xml><?xml version="1.0" encoding="utf-8"?>
+<file path=ppt/slides/slide6.xml><?xml version="1.0" encoding="utf-8"?>
 <p:sld xmlns:a="http://schemas.openxmlformats.org/drawingml/2006/main" xmlns:r="http://schemas.openxmlformats.org/officeDocument/2006/relationships" xmlns:p="http://schemas.openxmlformats.org/presentationml/2006/main">
   <p:cSld>
     <p:bg>
@@ -7986,7 +7032,7 @@
           <a:p>
             <a:fld id="{B822FDE6-25CA-0444-94EE-C6FC8C5EFEB8}" type="slidenum">
               <a:rPr lang="en-US" smtClean="0"/>
-              <a:t>7</a:t>
+              <a:t>6</a:t>
             </a:fld>
             <a:endParaRPr lang="en-US"/>
           </a:p>
@@ -8098,7 +7144,7 @@
 </p:sld>
 </file>
 
-<file path=ppt/slides/slide8.xml><?xml version="1.0" encoding="utf-8"?>
+<file path=ppt/slides/slide7.xml><?xml version="1.0" encoding="utf-8"?>
 <p:sld xmlns:a="http://schemas.openxmlformats.org/drawingml/2006/main" xmlns:r="http://schemas.openxmlformats.org/officeDocument/2006/relationships" xmlns:p="http://schemas.openxmlformats.org/presentationml/2006/main">
   <p:cSld>
     <p:bg>
@@ -8143,7 +7189,7 @@
           <a:p>
             <a:fld id="{B822FDE6-25CA-0444-94EE-C6FC8C5EFEB8}" type="slidenum">
               <a:rPr lang="en-US" smtClean="0"/>
-              <a:t>8</a:t>
+              <a:t>7</a:t>
             </a:fld>
             <a:endParaRPr lang="en-US"/>
           </a:p>
@@ -8265,7 +7311,7 @@
 </p:sld>
 </file>
 
-<file path=ppt/slides/slide9.xml><?xml version="1.0" encoding="utf-8"?>
+<file path=ppt/slides/slide8.xml><?xml version="1.0" encoding="utf-8"?>
 <p:sld xmlns:a="http://schemas.openxmlformats.org/drawingml/2006/main" xmlns:r="http://schemas.openxmlformats.org/officeDocument/2006/relationships" xmlns:p="http://schemas.openxmlformats.org/presentationml/2006/main">
   <p:cSld>
     <p:bg>
@@ -8310,7 +7356,7 @@
           <a:p>
             <a:fld id="{B822FDE6-25CA-0444-94EE-C6FC8C5EFEB8}" type="slidenum">
               <a:rPr lang="en-US" smtClean="0"/>
-              <a:t>9</a:t>
+              <a:t>8</a:t>
             </a:fld>
             <a:endParaRPr lang="en-US"/>
           </a:p>
@@ -8457,6 +7503,204 @@
     <p:extLst>
       <p:ext uri="{BB962C8B-B14F-4D97-AF65-F5344CB8AC3E}">
         <p14:creationId xmlns:p14="http://schemas.microsoft.com/office/powerpoint/2010/main" val="720776842"/>
+      </p:ext>
+    </p:extLst>
+  </p:cSld>
+  <p:clrMapOvr>
+    <a:masterClrMapping/>
+  </p:clrMapOvr>
+  <p:timing>
+    <p:tnLst>
+      <p:par>
+        <p:cTn id="1" dur="indefinite" restart="never" nodeType="tmRoot"/>
+      </p:par>
+    </p:tnLst>
+  </p:timing>
+</p:sld>
+</file>
+
+<file path=ppt/slides/slide9.xml><?xml version="1.0" encoding="utf-8"?>
+<p:sld xmlns:a="http://schemas.openxmlformats.org/drawingml/2006/main" xmlns:r="http://schemas.openxmlformats.org/officeDocument/2006/relationships" xmlns:p="http://schemas.openxmlformats.org/presentationml/2006/main">
+  <p:cSld>
+    <p:bg>
+      <p:bgPr>
+        <a:solidFill>
+          <a:schemeClr val="accent5">
+            <a:lumMod val="60000"/>
+            <a:lumOff val="40000"/>
+          </a:schemeClr>
+        </a:solidFill>
+        <a:effectLst/>
+      </p:bgPr>
+    </p:bg>
+    <p:spTree>
+      <p:nvGrpSpPr>
+        <p:cNvPr id="1" name=""/>
+        <p:cNvGrpSpPr/>
+        <p:nvPr/>
+      </p:nvGrpSpPr>
+      <p:grpSpPr>
+        <a:xfrm>
+          <a:off x="0" y="0"/>
+          <a:ext cx="0" cy="0"/>
+          <a:chOff x="0" y="0"/>
+          <a:chExt cx="0" cy="0"/>
+        </a:xfrm>
+      </p:grpSpPr>
+      <p:sp>
+        <p:nvSpPr>
+          <p:cNvPr id="9" name="Slide Number Placeholder 8"/>
+          <p:cNvSpPr>
+            <a:spLocks noGrp="1"/>
+          </p:cNvSpPr>
+          <p:nvPr>
+            <p:ph type="sldNum" sz="quarter" idx="12"/>
+          </p:nvPr>
+        </p:nvSpPr>
+        <p:spPr/>
+        <p:txBody>
+          <a:bodyPr/>
+          <a:lstStyle/>
+          <a:p>
+            <a:fld id="{B822FDE6-25CA-0444-94EE-C6FC8C5EFEB8}" type="slidenum">
+              <a:rPr lang="en-US" smtClean="0"/>
+              <a:t>9</a:t>
+            </a:fld>
+            <a:endParaRPr lang="en-US"/>
+          </a:p>
+        </p:txBody>
+      </p:sp>
+      <p:sp>
+        <p:nvSpPr>
+          <p:cNvPr id="4" name="Rectangle 3"/>
+          <p:cNvSpPr/>
+          <p:nvPr/>
+        </p:nvSpPr>
+        <p:spPr>
+          <a:xfrm>
+            <a:off x="0" y="1299607"/>
+            <a:ext cx="12192000" cy="2800767"/>
+          </a:xfrm>
+          <a:prstGeom prst="rect">
+            <a:avLst/>
+          </a:prstGeom>
+          <a:noFill/>
+        </p:spPr>
+        <p:txBody>
+          <a:bodyPr wrap="square" lIns="91440" tIns="45720" rIns="91440" bIns="45720">
+            <a:spAutoFit/>
+          </a:bodyPr>
+          <a:lstStyle/>
+          <a:p>
+            <a:r>
+              <a:rPr lang="en-US" sz="3800" dirty="0" smtClean="0"/>
+              <a:t>	</a:t>
+            </a:r>
+            <a:r>
+              <a:rPr lang="en-US" sz="3800" b="1" dirty="0" smtClean="0"/>
+              <a:t>Reduce</a:t>
+            </a:r>
+          </a:p>
+          <a:p>
+            <a:endParaRPr lang="en-US" sz="3800" b="1" dirty="0"/>
+          </a:p>
+          <a:p>
+            <a:pPr marL="1485900" lvl="2" indent="-571500">
+              <a:buFont typeface="Arial" charset="0"/>
+              <a:buChar char="•"/>
+            </a:pPr>
+            <a:r>
+              <a:rPr lang="en-US" sz="2500" dirty="0"/>
+              <a:t>Takes a </a:t>
+            </a:r>
+            <a:r>
+              <a:rPr lang="en-US" sz="2500" dirty="0" smtClean="0"/>
+              <a:t>function </a:t>
+            </a:r>
+            <a:r>
+              <a:rPr lang="en-US" sz="2500" dirty="0"/>
+              <a:t>and a sequence</a:t>
+            </a:r>
+          </a:p>
+          <a:p>
+            <a:pPr marL="1485900" lvl="2" indent="-571500">
+              <a:buFont typeface="Arial" charset="0"/>
+              <a:buChar char="•"/>
+            </a:pPr>
+            <a:r>
+              <a:rPr lang="en-US" sz="2500" dirty="0"/>
+              <a:t>F</a:t>
+            </a:r>
+            <a:r>
+              <a:rPr lang="en-US" sz="2500" dirty="0" smtClean="0"/>
+              <a:t>unction is applied to items one and two of the sequence</a:t>
+            </a:r>
+          </a:p>
+          <a:p>
+            <a:pPr marL="1485900" lvl="2" indent="-571500">
+              <a:buFont typeface="Arial" charset="0"/>
+              <a:buChar char="•"/>
+            </a:pPr>
+            <a:r>
+              <a:rPr lang="en-US" sz="2500" dirty="0" smtClean="0"/>
+              <a:t>Function is then applied to the result of that step and item three</a:t>
+            </a:r>
+            <a:r>
+              <a:rPr lang="mr-IN" sz="2500" dirty="0" smtClean="0"/>
+              <a:t>…</a:t>
+            </a:r>
+            <a:r>
+              <a:rPr lang="en-AU" sz="2500" dirty="0" smtClean="0"/>
+              <a:t>so on</a:t>
+            </a:r>
+          </a:p>
+          <a:p>
+            <a:pPr marL="1485900" lvl="2" indent="-571500">
+              <a:buFont typeface="Arial" charset="0"/>
+              <a:buChar char="•"/>
+            </a:pPr>
+            <a:r>
+              <a:rPr lang="en-AU" sz="2500" dirty="0" smtClean="0"/>
+              <a:t>At the end, only one value remains</a:t>
+            </a:r>
+            <a:endParaRPr lang="en-US" sz="2500" dirty="0" smtClean="0"/>
+          </a:p>
+        </p:txBody>
+      </p:sp>
+      <p:pic>
+        <p:nvPicPr>
+          <p:cNvPr id="2" name="Picture 1"/>
+          <p:cNvPicPr>
+            <a:picLocks noChangeAspect="1"/>
+          </p:cNvPicPr>
+          <p:nvPr/>
+        </p:nvPicPr>
+        <p:blipFill>
+          <a:blip r:embed="rId3">
+            <a:extLst>
+              <a:ext uri="{28A0092B-C50C-407E-A947-70E740481C1C}">
+                <a14:useLocalDpi xmlns:a14="http://schemas.microsoft.com/office/drawing/2010/main" val="0"/>
+              </a:ext>
+            </a:extLst>
+          </a:blip>
+          <a:stretch>
+            <a:fillRect/>
+          </a:stretch>
+        </p:blipFill>
+        <p:spPr>
+          <a:xfrm>
+            <a:off x="6997362" y="3878840"/>
+            <a:ext cx="3226475" cy="2660072"/>
+          </a:xfrm>
+          <a:prstGeom prst="rect">
+            <a:avLst/>
+          </a:prstGeom>
+        </p:spPr>
+      </p:pic>
+    </p:spTree>
+    <p:extLst>
+      <p:ext uri="{BB962C8B-B14F-4D97-AF65-F5344CB8AC3E}">
+        <p14:creationId xmlns:p14="http://schemas.microsoft.com/office/powerpoint/2010/main" val="1666585507"/>
       </p:ext>
     </p:extLst>
   </p:cSld>

</xml_diff>